<commit_message>
made VSV G consistent. addnl edits
</commit_message>
<xml_diff>
--- a/figures/ACE2_figure.pptx
+++ b/figures/ACE2_figure.pptx
@@ -270,7 +270,7 @@
           <a:p>
             <a:fld id="{E57E3636-6CEE-624E-99CB-F229DA9C2668}" type="datetimeFigureOut">
               <a:rPr lang="en-US" smtClean="0"/>
-              <a:t>4/17/20</a:t>
+              <a:t>4/18/20</a:t>
             </a:fld>
             <a:endParaRPr lang="en-US"/>
           </a:p>
@@ -468,7 +468,7 @@
           <a:p>
             <a:fld id="{E57E3636-6CEE-624E-99CB-F229DA9C2668}" type="datetimeFigureOut">
               <a:rPr lang="en-US" smtClean="0"/>
-              <a:t>4/17/20</a:t>
+              <a:t>4/18/20</a:t>
             </a:fld>
             <a:endParaRPr lang="en-US"/>
           </a:p>
@@ -676,7 +676,7 @@
           <a:p>
             <a:fld id="{E57E3636-6CEE-624E-99CB-F229DA9C2668}" type="datetimeFigureOut">
               <a:rPr lang="en-US" smtClean="0"/>
-              <a:t>4/17/20</a:t>
+              <a:t>4/18/20</a:t>
             </a:fld>
             <a:endParaRPr lang="en-US"/>
           </a:p>
@@ -874,7 +874,7 @@
           <a:p>
             <a:fld id="{E57E3636-6CEE-624E-99CB-F229DA9C2668}" type="datetimeFigureOut">
               <a:rPr lang="en-US" smtClean="0"/>
-              <a:t>4/17/20</a:t>
+              <a:t>4/18/20</a:t>
             </a:fld>
             <a:endParaRPr lang="en-US"/>
           </a:p>
@@ -1149,7 +1149,7 @@
           <a:p>
             <a:fld id="{E57E3636-6CEE-624E-99CB-F229DA9C2668}" type="datetimeFigureOut">
               <a:rPr lang="en-US" smtClean="0"/>
-              <a:t>4/17/20</a:t>
+              <a:t>4/18/20</a:t>
             </a:fld>
             <a:endParaRPr lang="en-US"/>
           </a:p>
@@ -1414,7 +1414,7 @@
           <a:p>
             <a:fld id="{E57E3636-6CEE-624E-99CB-F229DA9C2668}" type="datetimeFigureOut">
               <a:rPr lang="en-US" smtClean="0"/>
-              <a:t>4/17/20</a:t>
+              <a:t>4/18/20</a:t>
             </a:fld>
             <a:endParaRPr lang="en-US"/>
           </a:p>
@@ -1826,7 +1826,7 @@
           <a:p>
             <a:fld id="{E57E3636-6CEE-624E-99CB-F229DA9C2668}" type="datetimeFigureOut">
               <a:rPr lang="en-US" smtClean="0"/>
-              <a:t>4/17/20</a:t>
+              <a:t>4/18/20</a:t>
             </a:fld>
             <a:endParaRPr lang="en-US"/>
           </a:p>
@@ -1967,7 +1967,7 @@
           <a:p>
             <a:fld id="{E57E3636-6CEE-624E-99CB-F229DA9C2668}" type="datetimeFigureOut">
               <a:rPr lang="en-US" smtClean="0"/>
-              <a:t>4/17/20</a:t>
+              <a:t>4/18/20</a:t>
             </a:fld>
             <a:endParaRPr lang="en-US"/>
           </a:p>
@@ -2080,7 +2080,7 @@
           <a:p>
             <a:fld id="{E57E3636-6CEE-624E-99CB-F229DA9C2668}" type="datetimeFigureOut">
               <a:rPr lang="en-US" smtClean="0"/>
-              <a:t>4/17/20</a:t>
+              <a:t>4/18/20</a:t>
             </a:fld>
             <a:endParaRPr lang="en-US"/>
           </a:p>
@@ -2391,7 +2391,7 @@
           <a:p>
             <a:fld id="{E57E3636-6CEE-624E-99CB-F229DA9C2668}" type="datetimeFigureOut">
               <a:rPr lang="en-US" smtClean="0"/>
-              <a:t>4/17/20</a:t>
+              <a:t>4/18/20</a:t>
             </a:fld>
             <a:endParaRPr lang="en-US"/>
           </a:p>
@@ -2679,7 +2679,7 @@
           <a:p>
             <a:fld id="{E57E3636-6CEE-624E-99CB-F229DA9C2668}" type="datetimeFigureOut">
               <a:rPr lang="en-US" smtClean="0"/>
-              <a:t>4/17/20</a:t>
+              <a:t>4/18/20</a:t>
             </a:fld>
             <a:endParaRPr lang="en-US"/>
           </a:p>
@@ -2920,7 +2920,7 @@
           <a:p>
             <a:fld id="{E57E3636-6CEE-624E-99CB-F229DA9C2668}" type="datetimeFigureOut">
               <a:rPr lang="en-US" smtClean="0"/>
-              <a:t>4/17/20</a:t>
+              <a:t>4/18/20</a:t>
             </a:fld>
             <a:endParaRPr lang="en-US"/>
           </a:p>
@@ -3555,10 +3555,10 @@
               </p:nvGrpSpPr>
               <p:grpSpPr>
                 <a:xfrm>
-                  <a:off x="2117023" y="4950105"/>
-                  <a:ext cx="1430216" cy="569137"/>
-                  <a:chOff x="2080426" y="5386515"/>
-                  <a:chExt cx="1430216" cy="569137"/>
+                  <a:off x="1978315" y="4989640"/>
+                  <a:ext cx="2044583" cy="529602"/>
+                  <a:chOff x="1941718" y="5426050"/>
+                  <a:chExt cx="2044583" cy="529602"/>
                 </a:xfrm>
               </p:grpSpPr>
               <p:sp>
@@ -3632,8 +3632,8 @@
                 </p:nvSpPr>
                 <p:spPr>
                   <a:xfrm>
-                    <a:off x="2102213" y="5386515"/>
-                    <a:ext cx="1257075" cy="369332"/>
+                    <a:off x="1941718" y="5426050"/>
+                    <a:ext cx="2044583" cy="511239"/>
                   </a:xfrm>
                   <a:prstGeom prst="rect">
                     <a:avLst/>
@@ -3650,7 +3650,7 @@
                   <a:p>
                     <a:r>
                       <a:rPr lang="en-US" dirty="0"/>
-                      <a:t>ACE2 (FITC)</a:t>
+                      <a:t>ACE2 (AF488)</a:t>
                     </a:r>
                   </a:p>
                 </p:txBody>

</xml_diff>